<commit_message>
Updated presentation for lab 4 with tool stuff and protocol stuff
</commit_message>
<xml_diff>
--- a/Presentations/RoboticorpLab4.pptx
+++ b/Presentations/RoboticorpLab4.pptx
@@ -9,9 +9,10 @@
     <p:sldId id="258" r:id="rId3"/>
     <p:sldId id="259" r:id="rId4"/>
     <p:sldId id="260" r:id="rId5"/>
-    <p:sldId id="261" r:id="rId6"/>
-    <p:sldId id="262" r:id="rId7"/>
-    <p:sldId id="263" r:id="rId8"/>
+    <p:sldId id="264" r:id="rId6"/>
+    <p:sldId id="261" r:id="rId7"/>
+    <p:sldId id="262" r:id="rId8"/>
+    <p:sldId id="263" r:id="rId9"/>
   </p:sldIdLst>
   <p:sldSz cx="9144000" cy="6858000" type="screen4x3"/>
   <p:notesSz cx="6858000" cy="9144000"/>
@@ -738,7 +739,7 @@
           <a:p>
             <a:fld id="{578D3EDA-CDD4-4B8C-8889-A1E60E6090FC}" type="datetimeFigureOut">
               <a:rPr lang="en-US" smtClean="0"/>
-              <a:t>3/3/2013</a:t>
+              <a:t>3/4/13</a:t>
             </a:fld>
             <a:endParaRPr lang="en-US"/>
           </a:p>
@@ -934,7 +935,7 @@
           <a:p>
             <a:fld id="{578D3EDA-CDD4-4B8C-8889-A1E60E6090FC}" type="datetimeFigureOut">
               <a:rPr lang="en-US" smtClean="0"/>
-              <a:t>3/3/2013</a:t>
+              <a:t>3/4/13</a:t>
             </a:fld>
             <a:endParaRPr lang="en-US"/>
           </a:p>
@@ -1119,7 +1120,7 @@
           <a:p>
             <a:fld id="{578D3EDA-CDD4-4B8C-8889-A1E60E6090FC}" type="datetimeFigureOut">
               <a:rPr lang="en-US" smtClean="0"/>
-              <a:t>3/3/2013</a:t>
+              <a:t>3/4/13</a:t>
             </a:fld>
             <a:endParaRPr lang="en-US"/>
           </a:p>
@@ -1269,7 +1270,7 @@
           <a:p>
             <a:fld id="{578D3EDA-CDD4-4B8C-8889-A1E60E6090FC}" type="datetimeFigureOut">
               <a:rPr lang="en-US" smtClean="0"/>
-              <a:t>3/3/2013</a:t>
+              <a:t>3/4/13</a:t>
             </a:fld>
             <a:endParaRPr lang="en-US"/>
           </a:p>
@@ -1524,7 +1525,7 @@
           <a:p>
             <a:fld id="{578D3EDA-CDD4-4B8C-8889-A1E60E6090FC}" type="datetimeFigureOut">
               <a:rPr lang="en-US" smtClean="0"/>
-              <a:t>3/3/2013</a:t>
+              <a:t>3/4/13</a:t>
             </a:fld>
             <a:endParaRPr lang="en-US"/>
           </a:p>
@@ -1933,7 +1934,7 @@
           <a:p>
             <a:fld id="{578D3EDA-CDD4-4B8C-8889-A1E60E6090FC}" type="datetimeFigureOut">
               <a:rPr lang="en-US" smtClean="0"/>
-              <a:t>3/3/2013</a:t>
+              <a:t>3/4/13</a:t>
             </a:fld>
             <a:endParaRPr lang="en-US"/>
           </a:p>
@@ -2379,7 +2380,7 @@
           <a:p>
             <a:fld id="{578D3EDA-CDD4-4B8C-8889-A1E60E6090FC}" type="datetimeFigureOut">
               <a:rPr lang="en-US" smtClean="0"/>
-              <a:t>3/3/2013</a:t>
+              <a:t>3/4/13</a:t>
             </a:fld>
             <a:endParaRPr lang="en-US"/>
           </a:p>
@@ -2480,7 +2481,7 @@
           <a:p>
             <a:fld id="{578D3EDA-CDD4-4B8C-8889-A1E60E6090FC}" type="datetimeFigureOut">
               <a:rPr lang="en-US" smtClean="0"/>
-              <a:t>3/3/2013</a:t>
+              <a:t>3/4/13</a:t>
             </a:fld>
             <a:endParaRPr lang="en-US"/>
           </a:p>
@@ -2601,7 +2602,7 @@
           <a:p>
             <a:fld id="{578D3EDA-CDD4-4B8C-8889-A1E60E6090FC}" type="datetimeFigureOut">
               <a:rPr lang="en-US" smtClean="0"/>
-              <a:t>3/3/2013</a:t>
+              <a:t>3/4/13</a:t>
             </a:fld>
             <a:endParaRPr lang="en-US"/>
           </a:p>
@@ -2875,7 +2876,7 @@
           <a:p>
             <a:fld id="{578D3EDA-CDD4-4B8C-8889-A1E60E6090FC}" type="datetimeFigureOut">
               <a:rPr lang="en-US" smtClean="0"/>
-              <a:t>3/3/2013</a:t>
+              <a:t>3/4/13</a:t>
             </a:fld>
             <a:endParaRPr lang="en-US"/>
           </a:p>
@@ -3080,7 +3081,7 @@
           <a:p>
             <a:fld id="{578D3EDA-CDD4-4B8C-8889-A1E60E6090FC}" type="datetimeFigureOut">
               <a:rPr lang="en-US" smtClean="0"/>
-              <a:t>3/3/2013</a:t>
+              <a:t>3/4/13</a:t>
             </a:fld>
             <a:endParaRPr lang="en-US"/>
           </a:p>
@@ -4189,7 +4190,7 @@
           <a:p>
             <a:fld id="{578D3EDA-CDD4-4B8C-8889-A1E60E6090FC}" type="datetimeFigureOut">
               <a:rPr lang="en-US" smtClean="0"/>
-              <a:t>3/3/2013</a:t>
+              <a:t>3/4/13</a:t>
             </a:fld>
             <a:endParaRPr lang="en-US"/>
           </a:p>
@@ -4708,7 +4709,7 @@
   <p:timing>
     <p:tnLst>
       <p:par>
-        <p:cTn id="1" dur="indefinite" restart="never" nodeType="tmRoot"/>
+        <p:cTn xmlns:p14="http://schemas.microsoft.com/office/powerpoint/2010/main" id="1" dur="indefinite" restart="never" nodeType="tmRoot"/>
       </p:par>
     </p:tnLst>
   </p:timing>
@@ -4821,7 +4822,7 @@
   <p:timing>
     <p:tnLst>
       <p:par>
-        <p:cTn id="1" dur="indefinite" restart="never" nodeType="tmRoot"/>
+        <p:cTn xmlns:p14="http://schemas.microsoft.com/office/powerpoint/2010/main" id="1" dur="indefinite" restart="never" nodeType="tmRoot"/>
       </p:par>
     </p:tnLst>
   </p:timing>
@@ -5102,7 +5103,7 @@
   <p:timing>
     <p:tnLst>
       <p:par>
-        <p:cTn id="1" dur="indefinite" restart="never" nodeType="tmRoot"/>
+        <p:cTn xmlns:p14="http://schemas.microsoft.com/office/powerpoint/2010/main" id="1" dur="indefinite" restart="never" nodeType="tmRoot"/>
       </p:par>
     </p:tnLst>
   </p:timing>
@@ -5865,7 +5866,7 @@
   <p:timing>
     <p:tnLst>
       <p:par>
-        <p:cTn id="1" dur="indefinite" restart="never" nodeType="tmRoot"/>
+        <p:cTn xmlns:p14="http://schemas.microsoft.com/office/powerpoint/2010/main" id="1" dur="indefinite" restart="never" nodeType="tmRoot"/>
       </p:par>
     </p:tnLst>
   </p:timing>
@@ -5904,7 +5905,17 @@
           <a:bodyPr/>
           <a:lstStyle/>
           <a:p>
-            <a:endParaRPr lang="en-US"/>
+            <a:r>
+              <a:rPr lang="en-US" dirty="0" smtClean="0"/>
+              <a:t>Error Handling is currently planned to be a checksum with time out</a:t>
+            </a:r>
+          </a:p>
+          <a:p>
+            <a:r>
+              <a:rPr lang="en-US" dirty="0" smtClean="0"/>
+              <a:t>Should the checksum find an error, the robot will not send an ACK message, causing a timeout on the base station resulting in the message being resent</a:t>
+            </a:r>
+            <a:endParaRPr lang="en-US" dirty="0"/>
           </a:p>
         </p:txBody>
       </p:sp>
@@ -5926,7 +5937,7 @@
             <a:pPr algn="ctr"/>
             <a:r>
               <a:rPr lang="en-US" dirty="0" smtClean="0"/>
-              <a:t>Functionality</a:t>
+              <a:t>Details Cont.</a:t>
             </a:r>
             <a:endParaRPr lang="en-US" dirty="0"/>
           </a:p>
@@ -5935,7 +5946,7 @@
     </p:spTree>
     <p:extLst>
       <p:ext uri="{BB962C8B-B14F-4D97-AF65-F5344CB8AC3E}">
-        <p14:creationId xmlns:p14="http://schemas.microsoft.com/office/powerpoint/2010/main" val="2088773494"/>
+        <p14:creationId xmlns:p14="http://schemas.microsoft.com/office/powerpoint/2010/main" val="4241789689"/>
       </p:ext>
     </p:extLst>
   </p:cSld>
@@ -5977,7 +5988,24 @@
           <a:bodyPr/>
           <a:lstStyle/>
           <a:p>
-            <a:endParaRPr lang="en-US"/>
+            <a:r>
+              <a:rPr lang="en-US" dirty="0" smtClean="0"/>
+              <a:t>The Testing Tool</a:t>
+            </a:r>
+          </a:p>
+          <a:p>
+            <a:pPr lvl="1"/>
+            <a:r>
+              <a:rPr lang="en-US" dirty="0" smtClean="0"/>
+              <a:t>Uses command line instructions to implement the protocol and send a message to the robot</a:t>
+            </a:r>
+          </a:p>
+          <a:p>
+            <a:pPr lvl="1"/>
+            <a:r>
+              <a:rPr lang="en-US" dirty="0" smtClean="0"/>
+              <a:t>Supports all the commands described in the protocol that the base station needs to send to the robot</a:t>
+            </a:r>
           </a:p>
         </p:txBody>
       </p:sp>
@@ -5999,7 +6027,7 @@
             <a:pPr algn="ctr"/>
             <a:r>
               <a:rPr lang="en-US" dirty="0" smtClean="0"/>
-              <a:t>Design</a:t>
+              <a:t>Functionality</a:t>
             </a:r>
             <a:endParaRPr lang="en-US" dirty="0"/>
           </a:p>
@@ -6008,7 +6036,7 @@
     </p:spTree>
     <p:extLst>
       <p:ext uri="{BB962C8B-B14F-4D97-AF65-F5344CB8AC3E}">
-        <p14:creationId xmlns:p14="http://schemas.microsoft.com/office/powerpoint/2010/main" val="3207019886"/>
+        <p14:creationId xmlns:p14="http://schemas.microsoft.com/office/powerpoint/2010/main" val="2088773494"/>
       </p:ext>
     </p:extLst>
   </p:cSld>
@@ -6047,10 +6075,129 @@
         </p:nvSpPr>
         <p:spPr/>
         <p:txBody>
+          <a:bodyPr>
+            <a:normAutofit lnSpcReduction="10000"/>
+          </a:bodyPr>
+          <a:lstStyle/>
+          <a:p>
+            <a:r>
+              <a:rPr lang="en-US" dirty="0" smtClean="0"/>
+              <a:t>The testing tool was designed using sample code available on </a:t>
+            </a:r>
+            <a:r>
+              <a:rPr lang="en-US" dirty="0" err="1" smtClean="0"/>
+              <a:t>collab</a:t>
+            </a:r>
+            <a:r>
+              <a:rPr lang="en-US" dirty="0" smtClean="0"/>
+              <a:t> to create the USB/Bluetooth connection between computer and robot</a:t>
+            </a:r>
+          </a:p>
+          <a:p>
+            <a:r>
+              <a:rPr lang="en-US" dirty="0" smtClean="0"/>
+              <a:t>Then the communications protocol was implemented using command line input to create messages that can be sent to the robot.</a:t>
+            </a:r>
+          </a:p>
+          <a:p>
+            <a:r>
+              <a:rPr lang="en-US" dirty="0" smtClean="0"/>
+              <a:t>Additionally a copy of the program was created without the NXT connection functionality</a:t>
+            </a:r>
+            <a:endParaRPr lang="en-US" dirty="0"/>
+          </a:p>
+        </p:txBody>
+      </p:sp>
+      <p:sp>
+        <p:nvSpPr>
+          <p:cNvPr id="3" name="Title 2"/>
+          <p:cNvSpPr>
+            <a:spLocks noGrp="1"/>
+          </p:cNvSpPr>
+          <p:nvPr>
+            <p:ph type="title"/>
+          </p:nvPr>
+        </p:nvSpPr>
+        <p:spPr/>
+        <p:txBody>
           <a:bodyPr/>
           <a:lstStyle/>
           <a:p>
-            <a:endParaRPr lang="en-US"/>
+            <a:pPr algn="ctr"/>
+            <a:r>
+              <a:rPr lang="en-US" dirty="0" smtClean="0"/>
+              <a:t>Design</a:t>
+            </a:r>
+            <a:endParaRPr lang="en-US" dirty="0"/>
+          </a:p>
+        </p:txBody>
+      </p:sp>
+    </p:spTree>
+    <p:extLst>
+      <p:ext uri="{BB962C8B-B14F-4D97-AF65-F5344CB8AC3E}">
+        <p14:creationId xmlns:p14="http://schemas.microsoft.com/office/powerpoint/2010/main" val="3207019886"/>
+      </p:ext>
+    </p:extLst>
+  </p:cSld>
+  <p:clrMapOvr>
+    <a:masterClrMapping/>
+  </p:clrMapOvr>
+</p:sld>
+</file>
+
+<file path=ppt/slides/slide8.xml><?xml version="1.0" encoding="utf-8"?>
+<p:sld xmlns:a="http://schemas.openxmlformats.org/drawingml/2006/main" xmlns:r="http://schemas.openxmlformats.org/officeDocument/2006/relationships" xmlns:p="http://schemas.openxmlformats.org/presentationml/2006/main">
+  <p:cSld>
+    <p:spTree>
+      <p:nvGrpSpPr>
+        <p:cNvPr id="1" name=""/>
+        <p:cNvGrpSpPr/>
+        <p:nvPr/>
+      </p:nvGrpSpPr>
+      <p:grpSpPr>
+        <a:xfrm>
+          <a:off x="0" y="0"/>
+          <a:ext cx="0" cy="0"/>
+          <a:chOff x="0" y="0"/>
+          <a:chExt cx="0" cy="0"/>
+        </a:xfrm>
+      </p:grpSpPr>
+      <p:sp>
+        <p:nvSpPr>
+          <p:cNvPr id="2" name="Content Placeholder 1"/>
+          <p:cNvSpPr>
+            <a:spLocks noGrp="1"/>
+          </p:cNvSpPr>
+          <p:nvPr>
+            <p:ph idx="1"/>
+          </p:nvPr>
+        </p:nvSpPr>
+        <p:spPr/>
+        <p:txBody>
+          <a:bodyPr/>
+          <a:lstStyle/>
+          <a:p>
+            <a:r>
+              <a:rPr lang="en-US" dirty="0" smtClean="0"/>
+              <a:t>Our </a:t>
+            </a:r>
+            <a:r>
+              <a:rPr lang="en-US" dirty="0" smtClean="0"/>
+              <a:t>development support tool has a basic implementation</a:t>
+            </a:r>
+          </a:p>
+          <a:p>
+            <a:r>
+              <a:rPr lang="en-US" dirty="0" smtClean="0"/>
+              <a:t>Some user commands are set to default values (Moving in an arc and a help method). </a:t>
+            </a:r>
+          </a:p>
+          <a:p>
+            <a:r>
+              <a:rPr lang="en-US" dirty="0" smtClean="0"/>
+              <a:t>Otherwise, the protocol has been completely implemented, and the program can send the messages to the robot</a:t>
+            </a:r>
+            <a:endParaRPr lang="en-US" dirty="0"/>
           </a:p>
         </p:txBody>
       </p:sp>

</xml_diff>

<commit_message>
Edited presentation lab 4
</commit_message>
<xml_diff>
--- a/Presentations/RoboticorpLab4.pptx
+++ b/Presentations/RoboticorpLab4.pptx
@@ -4865,7 +4865,11 @@
           <a:p>
             <a:r>
               <a:rPr lang="en-US" dirty="0" smtClean="0"/>
-              <a:t>10 byte character messages</a:t>
+              <a:t>10 </a:t>
+            </a:r>
+            <a:r>
+              <a:rPr lang="en-US" dirty="0" smtClean="0"/>
+              <a:t>character messages</a:t>
             </a:r>
           </a:p>
           <a:p>
@@ -5907,13 +5911,42 @@
           <a:p>
             <a:r>
               <a:rPr lang="en-US" dirty="0" smtClean="0"/>
-              <a:t>Error Handling is currently planned to be a checksum with time out</a:t>
-            </a:r>
-          </a:p>
-          <a:p>
+              <a:t>Message Sending:</a:t>
+            </a:r>
+          </a:p>
+          <a:p>
+            <a:pPr lvl="1"/>
             <a:r>
               <a:rPr lang="en-US" dirty="0" smtClean="0"/>
-              <a:t>Should the checksum find an error, the robot will not send an ACK message, causing a timeout on the base station resulting in the message being resent</a:t>
+              <a:t>Message is sent from base station to robot</a:t>
+            </a:r>
+          </a:p>
+          <a:p>
+            <a:pPr lvl="1"/>
+            <a:r>
+              <a:rPr lang="en-US" dirty="0" smtClean="0"/>
+              <a:t>Robot receives message and checks for error</a:t>
+            </a:r>
+          </a:p>
+          <a:p>
+            <a:pPr lvl="1"/>
+            <a:r>
+              <a:rPr lang="en-US" dirty="0" smtClean="0"/>
+              <a:t>If error, the robot waits for time out</a:t>
+            </a:r>
+          </a:p>
+          <a:p>
+            <a:pPr lvl="1"/>
+            <a:r>
+              <a:rPr lang="en-US" dirty="0" smtClean="0"/>
+              <a:t>If correct, the robot sends an ACK to the base station</a:t>
+            </a:r>
+          </a:p>
+          <a:p>
+            <a:pPr lvl="1"/>
+            <a:r>
+              <a:rPr lang="en-US" dirty="0" smtClean="0"/>
+              <a:t>On timeout, base station will resend the message</a:t>
             </a:r>
             <a:endParaRPr lang="en-US" dirty="0"/>
           </a:p>
@@ -6004,7 +6037,11 @@
             <a:pPr lvl="1"/>
             <a:r>
               <a:rPr lang="en-US" dirty="0" smtClean="0"/>
-              <a:t>Supports all the commands described in the protocol that the base station needs to send to the robot</a:t>
+              <a:t>Supports all the commands described in the protocol that the base station needs to send to the </a:t>
+            </a:r>
+            <a:r>
+              <a:rPr lang="en-US" dirty="0" smtClean="0"/>
+              <a:t>robot</a:t>
             </a:r>
           </a:p>
         </p:txBody>
@@ -6076,7 +6113,7 @@
         <p:spPr/>
         <p:txBody>
           <a:bodyPr>
-            <a:normAutofit lnSpcReduction="10000"/>
+            <a:normAutofit/>
           </a:bodyPr>
           <a:lstStyle/>
           <a:p>
@@ -6096,15 +6133,39 @@
           <a:p>
             <a:r>
               <a:rPr lang="en-US" dirty="0" smtClean="0"/>
-              <a:t>Then the communications protocol was implemented using command line input to create messages that can be sent to the robot.</a:t>
-            </a:r>
-          </a:p>
-          <a:p>
+              <a:t>Then the communications protocol was implemented using </a:t>
+            </a:r>
             <a:r>
               <a:rPr lang="en-US" dirty="0" smtClean="0"/>
-              <a:t>Additionally a copy of the program was created without the NXT connection functionality</a:t>
-            </a:r>
-            <a:endParaRPr lang="en-US" dirty="0"/>
+              <a:t>user entered input </a:t>
+            </a:r>
+            <a:r>
+              <a:rPr lang="en-US" dirty="0" smtClean="0"/>
+              <a:t>to create messages that </a:t>
+            </a:r>
+            <a:r>
+              <a:rPr lang="en-US" dirty="0" smtClean="0"/>
+              <a:t>are</a:t>
+            </a:r>
+            <a:r>
+              <a:rPr lang="en-US" dirty="0" smtClean="0"/>
+              <a:t> </a:t>
+            </a:r>
+            <a:r>
+              <a:rPr lang="en-US" dirty="0" smtClean="0"/>
+              <a:t>sent to the </a:t>
+            </a:r>
+            <a:r>
+              <a:rPr lang="en-US" dirty="0" smtClean="0"/>
+              <a:t>robot.</a:t>
+            </a:r>
+          </a:p>
+          <a:p>
+            <a:r>
+              <a:rPr lang="en-US" dirty="0" smtClean="0"/>
+              <a:t>The Main goal was to create messages using protocol to send to the robot</a:t>
+            </a:r>
+            <a:endParaRPr lang="en-US" dirty="0" smtClean="0"/>
           </a:p>
         </p:txBody>
       </p:sp>
@@ -6179,25 +6240,34 @@
           <a:p>
             <a:r>
               <a:rPr lang="en-US" dirty="0" smtClean="0"/>
-              <a:t>Our </a:t>
-            </a:r>
+              <a:t>Our development support tool has a basic implementation</a:t>
+            </a:r>
+          </a:p>
+          <a:p>
             <a:r>
               <a:rPr lang="en-US" dirty="0" smtClean="0"/>
-              <a:t>development support tool has a basic implementation</a:t>
-            </a:r>
-          </a:p>
-          <a:p>
+              <a:t>Some user commands are set to default values (Moving in an arc and a </a:t>
+            </a:r>
             <a:r>
               <a:rPr lang="en-US" dirty="0" smtClean="0"/>
-              <a:t>Some user commands are set to default values (Moving in an arc and a help method). </a:t>
-            </a:r>
-          </a:p>
-          <a:p>
+              <a:t>help listing </a:t>
+            </a:r>
             <a:r>
               <a:rPr lang="en-US" dirty="0" smtClean="0"/>
-              <a:t>Otherwise, the protocol has been completely implemented, and the program can send the messages to the robot</a:t>
-            </a:r>
-            <a:endParaRPr lang="en-US" dirty="0"/>
+              <a:t>method). </a:t>
+            </a:r>
+            <a:endParaRPr lang="en-US" dirty="0" smtClean="0"/>
+          </a:p>
+          <a:p>
+            <a:r>
+              <a:rPr lang="en-US" dirty="0" smtClean="0"/>
+              <a:t>Otherwise messages are created correctly, error handling is to be completed once we decide on a method for </a:t>
+            </a:r>
+            <a:r>
+              <a:rPr lang="en-US" smtClean="0"/>
+              <a:t>error checking</a:t>
+            </a:r>
+            <a:endParaRPr lang="en-US" dirty="0" smtClean="0"/>
           </a:p>
         </p:txBody>
       </p:sp>

</xml_diff>